<commit_message>
edited sequence on slide 11
</commit_message>
<xml_diff>
--- a/week9/week9.pptx
+++ b/week9/week9.pptx
@@ -347,7 +347,7 @@
           <a:p>
             <a:fld id="{4AAD347D-5ACD-4C99-B74B-A9C85AD731AF}" type="datetimeFigureOut">
               <a:rPr lang="en-US" dirty="0"/>
-              <a:t>9/16/2018</a:t>
+              <a:t>9/22/2018</a:t>
             </a:fld>
             <a:endParaRPr lang="en-US" dirty="0"/>
           </a:p>
@@ -617,7 +617,7 @@
           <a:p>
             <a:fld id="{4509A250-FF31-4206-8172-F9D3106AACB1}" type="datetimeFigureOut">
               <a:rPr lang="en-US" dirty="0"/>
-              <a:t>9/16/2018</a:t>
+              <a:t>9/22/2018</a:t>
             </a:fld>
             <a:endParaRPr lang="en-US" dirty="0"/>
           </a:p>
@@ -806,7 +806,7 @@
           <a:p>
             <a:fld id="{4509A250-FF31-4206-8172-F9D3106AACB1}" type="datetimeFigureOut">
               <a:rPr lang="en-US" dirty="0"/>
-              <a:t>9/16/2018</a:t>
+              <a:t>9/22/2018</a:t>
             </a:fld>
             <a:endParaRPr lang="en-US" dirty="0"/>
           </a:p>
@@ -1074,7 +1074,7 @@
           <a:p>
             <a:fld id="{4509A250-FF31-4206-8172-F9D3106AACB1}" type="datetimeFigureOut">
               <a:rPr lang="en-US" dirty="0"/>
-              <a:t>9/16/2018</a:t>
+              <a:t>9/22/2018</a:t>
             </a:fld>
             <a:endParaRPr lang="en-US" dirty="0"/>
           </a:p>
@@ -1410,7 +1410,7 @@
           <a:p>
             <a:fld id="{4509A250-FF31-4206-8172-F9D3106AACB1}" type="datetimeFigureOut">
               <a:rPr lang="en-US" dirty="0"/>
-              <a:t>9/16/2018</a:t>
+              <a:t>9/22/2018</a:t>
             </a:fld>
             <a:endParaRPr lang="en-US" dirty="0"/>
           </a:p>
@@ -2028,7 +2028,7 @@
           <a:p>
             <a:fld id="{4509A250-FF31-4206-8172-F9D3106AACB1}" type="datetimeFigureOut">
               <a:rPr lang="en-US" dirty="0"/>
-              <a:t>9/16/2018</a:t>
+              <a:t>9/22/2018</a:t>
             </a:fld>
             <a:endParaRPr lang="en-US" dirty="0"/>
           </a:p>
@@ -2883,7 +2883,7 @@
           <a:p>
             <a:fld id="{4509A250-FF31-4206-8172-F9D3106AACB1}" type="datetimeFigureOut">
               <a:rPr lang="en-US" dirty="0"/>
-              <a:t>9/16/2018</a:t>
+              <a:t>9/22/2018</a:t>
             </a:fld>
             <a:endParaRPr lang="en-US" dirty="0"/>
           </a:p>
@@ -3048,7 +3048,7 @@
           <a:p>
             <a:fld id="{4509A250-FF31-4206-8172-F9D3106AACB1}" type="datetimeFigureOut">
               <a:rPr lang="en-US" dirty="0"/>
-              <a:t>9/16/2018</a:t>
+              <a:t>9/22/2018</a:t>
             </a:fld>
             <a:endParaRPr lang="en-US" dirty="0"/>
           </a:p>
@@ -3223,7 +3223,7 @@
           <a:p>
             <a:fld id="{4509A250-FF31-4206-8172-F9D3106AACB1}" type="datetimeFigureOut">
               <a:rPr lang="en-US" dirty="0"/>
-              <a:t>9/16/2018</a:t>
+              <a:t>9/22/2018</a:t>
             </a:fld>
             <a:endParaRPr lang="en-US" dirty="0"/>
           </a:p>
@@ -3388,7 +3388,7 @@
           <a:p>
             <a:fld id="{4509A250-FF31-4206-8172-F9D3106AACB1}" type="datetimeFigureOut">
               <a:rPr lang="en-US" dirty="0"/>
-              <a:t>9/16/2018</a:t>
+              <a:t>9/22/2018</a:t>
             </a:fld>
             <a:endParaRPr lang="en-US" dirty="0"/>
           </a:p>
@@ -3630,7 +3630,7 @@
           <a:p>
             <a:fld id="{9796027F-7875-4030-9381-8BD8C4F21935}" type="datetimeFigureOut">
               <a:rPr lang="en-US" dirty="0"/>
-              <a:t>9/16/2018</a:t>
+              <a:t>9/22/2018</a:t>
             </a:fld>
             <a:endParaRPr lang="en-US" dirty="0"/>
           </a:p>
@@ -3917,7 +3917,7 @@
           <a:p>
             <a:fld id="{9796027F-7875-4030-9381-8BD8C4F21935}" type="datetimeFigureOut">
               <a:rPr lang="en-US" dirty="0"/>
-              <a:t>9/16/2018</a:t>
+              <a:t>9/22/2018</a:t>
             </a:fld>
             <a:endParaRPr lang="en-US" dirty="0"/>
           </a:p>
@@ -4356,7 +4356,7 @@
           <a:p>
             <a:fld id="{9796027F-7875-4030-9381-8BD8C4F21935}" type="datetimeFigureOut">
               <a:rPr lang="en-US" dirty="0"/>
-              <a:t>9/16/2018</a:t>
+              <a:t>9/22/2018</a:t>
             </a:fld>
             <a:endParaRPr lang="en-US" dirty="0"/>
           </a:p>
@@ -4469,7 +4469,7 @@
           <a:p>
             <a:fld id="{4509A250-FF31-4206-8172-F9D3106AACB1}" type="datetimeFigureOut">
               <a:rPr lang="en-US" dirty="0"/>
-              <a:t>9/16/2018</a:t>
+              <a:t>9/22/2018</a:t>
             </a:fld>
             <a:endParaRPr lang="en-US" dirty="0"/>
           </a:p>
@@ -4559,7 +4559,7 @@
           <a:p>
             <a:fld id="{4509A250-FF31-4206-8172-F9D3106AACB1}" type="datetimeFigureOut">
               <a:rPr lang="en-US" dirty="0"/>
-              <a:t>9/16/2018</a:t>
+              <a:t>9/22/2018</a:t>
             </a:fld>
             <a:endParaRPr lang="en-US" dirty="0"/>
           </a:p>
@@ -4833,7 +4833,7 @@
           <a:p>
             <a:fld id="{4509A250-FF31-4206-8172-F9D3106AACB1}" type="datetimeFigureOut">
               <a:rPr lang="en-US" dirty="0"/>
-              <a:t>9/16/2018</a:t>
+              <a:t>9/22/2018</a:t>
             </a:fld>
             <a:endParaRPr lang="en-US" dirty="0"/>
           </a:p>
@@ -5103,7 +5103,7 @@
           <a:p>
             <a:fld id="{4509A250-FF31-4206-8172-F9D3106AACB1}" type="datetimeFigureOut">
               <a:rPr lang="en-US" dirty="0"/>
-              <a:t>9/16/2018</a:t>
+              <a:t>9/22/2018</a:t>
             </a:fld>
             <a:endParaRPr lang="en-US" dirty="0"/>
           </a:p>
@@ -5527,7 +5527,7 @@
           <a:p>
             <a:fld id="{4AAD347D-5ACD-4C99-B74B-A9C85AD731AF}" type="datetimeFigureOut">
               <a:rPr lang="en-US" dirty="0"/>
-              <a:t>9/16/2018</a:t>
+              <a:t>9/22/2018</a:t>
             </a:fld>
             <a:endParaRPr lang="en-US" dirty="0"/>
           </a:p>
@@ -7187,7 +7187,21 @@
           <a:p>
             <a:r>
               <a:rPr lang="en-GB" dirty="0"/>
-              <a:t>The player rolls a dice and moves forward that many squares.</a:t>
+              <a:t>The player rolls </a:t>
+            </a:r>
+            <a:r>
+              <a:rPr lang="en-GB"/>
+              <a:t>a die </a:t>
+            </a:r>
+            <a:r>
+              <a:rPr lang="en-GB" dirty="0"/>
+              <a:t>and moves forward that many squares.</a:t>
+            </a:r>
+          </a:p>
+          <a:p>
+            <a:r>
+              <a:rPr lang="en-GB" dirty="0"/>
+              <a:t>Add one to the number of turns the player has taken.</a:t>
             </a:r>
           </a:p>
           <a:p>
@@ -7207,12 +7221,6 @@
             <a:r>
               <a:rPr lang="en-GB" dirty="0"/>
               <a:t>If they haven't won, they climb ladders or slide down snakes.</a:t>
-            </a:r>
-          </a:p>
-          <a:p>
-            <a:r>
-              <a:rPr lang="en-GB" dirty="0"/>
-              <a:t>Add one to the number of turns the player has taken.</a:t>
             </a:r>
           </a:p>
           <a:p>
@@ -7623,7 +7631,7 @@
                   <a:srgbClr val="FFFF00"/>
                 </a:solidFill>
               </a:rPr>
-              <a:t>Restructure example5 so it plays the game ten thousand </a:t>
+              <a:t>Restructure example5 so it plays the game ten thousand times </a:t>
             </a:r>
           </a:p>
           <a:p>

</xml_diff>